<commit_message>
Update Performance Analysis of Brain Tumor Detection Using Different Neural Networks Models (1).pptx
</commit_message>
<xml_diff>
--- a/brain tumor/Performance Analysis of Brain Tumor Detection Using Different Neural Networks Models (1).pptx
+++ b/brain tumor/Performance Analysis of Brain Tumor Detection Using Different Neural Networks Models (1).pptx
@@ -8745,7 +8745,7 @@
             </a:pPr>
             <a:r>
               <a:rPr lang="en-US" dirty="0"/>
-              <a:t>DAKSHYANI</a:t>
+              <a:t>NAMES                                                                                 	700#</a:t>
             </a:r>
           </a:p>
           <a:p>
@@ -8760,7 +8760,7 @@
             </a:pPr>
             <a:r>
               <a:rPr lang="en-US" dirty="0"/>
-              <a:t>SWETHA</a:t>
+              <a:t>MADDIKUNTA DAKSHYANI              		700666204</a:t>
             </a:r>
           </a:p>
           <a:p>
@@ -8775,7 +8775,7 @@
             </a:pPr>
             <a:r>
               <a:rPr lang="en-US" dirty="0"/>
-              <a:t>AKHILESH</a:t>
+              <a:t>SWETHA BANDARI				700740708</a:t>
             </a:r>
           </a:p>
           <a:p>
@@ -8789,10 +8789,25 @@
               <a:buNone/>
             </a:pPr>
             <a:r>
+              <a:rPr lang="en-US" dirty="0"/>
+              <a:t>AKHILESH CHENNABATNI MANDULA                       700759335</a:t>
+            </a:r>
+          </a:p>
+          <a:p>
+            <a:pPr marL="0" lvl="0" indent="0" algn="l" rtl="0">
+              <a:spcBef>
+                <a:spcPts val="0"/>
+              </a:spcBef>
+              <a:spcAft>
+                <a:spcPts val="1200"/>
+              </a:spcAft>
+              <a:buNone/>
+            </a:pPr>
+            <a:r>
               <a:rPr lang="en-US"/>
-              <a:t>GOVARDHANI</a:t>
+              <a:t>GOVARDHANI UPPALURI			700739664</a:t>
             </a:r>
-            <a:endParaRPr/>
+            <a:endParaRPr dirty="0"/>
           </a:p>
         </p:txBody>
       </p:sp>

</xml_diff>